<commit_message>
Update Flight Data Analytics presentation
</commit_message>
<xml_diff>
--- a/FLIGHT DATA ANALYTICS PRESENTATION.pptx
+++ b/FLIGHT DATA ANALYTICS PRESENTATION.pptx
@@ -113,6 +113,11 @@
       </a:defRPr>
     </a:lvl9pPr>
   </p:defaultTextStyle>
+  <p:extLst>
+    <p:ext uri="{EFAFB233-063F-42B5-8137-9DF3F51BA10A}">
+      <p15:sldGuideLst xmlns:p15="http://schemas.microsoft.com/office/powerpoint/2012/main"/>
+    </p:ext>
+  </p:extLst>
 </p:presentation>
 </file>
 

</xml_diff>

<commit_message>
Modification of jupyter notebook, README.md file as well as presentation
</commit_message>
<xml_diff>
--- a/FLIGHT DATA ANALYTICS PRESENTATION.pptx
+++ b/FLIGHT DATA ANALYTICS PRESENTATION.pptx
@@ -524,7 +524,7 @@
           <a:p>
             <a:fld id="{83284890-85D2-4D7B-8EF5-15A9C1DB8F42}" type="datetimeFigureOut">
               <a:rPr lang="en-US" dirty="0"/>
-              <a:t>11/27/2024</a:t>
+              <a:t>11/28/2024</a:t>
             </a:fld>
             <a:endParaRPr lang="en-US" dirty="0"/>
           </a:p>
@@ -699,7 +699,7 @@
           <a:p>
             <a:fld id="{87157CC2-0FC8-4686-B024-99790E0F5162}" type="datetimeFigureOut">
               <a:rPr lang="en-US" dirty="0"/>
-              <a:t>11/27/2024</a:t>
+              <a:t>11/28/2024</a:t>
             </a:fld>
             <a:endParaRPr lang="en-US" dirty="0"/>
           </a:p>
@@ -874,7 +874,7 @@
           <a:p>
             <a:fld id="{F6764DA5-CD3D-4590-A511-FCD3BC7A793E}" type="datetimeFigureOut">
               <a:rPr lang="en-US" dirty="0"/>
-              <a:t>11/27/2024</a:t>
+              <a:t>11/28/2024</a:t>
             </a:fld>
             <a:endParaRPr lang="en-US" dirty="0"/>
           </a:p>
@@ -1039,7 +1039,7 @@
           <a:p>
             <a:fld id="{82F5661D-6934-4B32-B92C-470368BF1EC6}" type="datetimeFigureOut">
               <a:rPr lang="en-US" dirty="0"/>
-              <a:t>11/27/2024</a:t>
+              <a:t>11/28/2024</a:t>
             </a:fld>
             <a:endParaRPr lang="en-US" dirty="0"/>
           </a:p>
@@ -1347,7 +1347,7 @@
           <a:p>
             <a:fld id="{C6F822A4-8DA6-4447-9B1F-C5DB58435268}" type="datetimeFigureOut">
               <a:rPr lang="en-US" dirty="0"/>
-              <a:t>11/27/2024</a:t>
+              <a:t>11/28/2024</a:t>
             </a:fld>
             <a:endParaRPr lang="en-US" dirty="0"/>
           </a:p>
@@ -1729,7 +1729,7 @@
           <a:p>
             <a:fld id="{E548D31E-DCDA-41A7-9C67-C4B11B94D21D}" type="datetimeFigureOut">
               <a:rPr lang="en-US" dirty="0"/>
-              <a:t>11/27/2024</a:t>
+              <a:t>11/28/2024</a:t>
             </a:fld>
             <a:endParaRPr lang="en-US" dirty="0"/>
           </a:p>
@@ -2158,7 +2158,7 @@
           <a:p>
             <a:fld id="{9B3762C0-B258-48F1-ADE6-176B4174CCDD}" type="datetimeFigureOut">
               <a:rPr lang="en-US" dirty="0"/>
-              <a:t>11/27/2024</a:t>
+              <a:t>11/28/2024</a:t>
             </a:fld>
             <a:endParaRPr lang="en-US" dirty="0"/>
           </a:p>
@@ -2271,7 +2271,7 @@
           <a:p>
             <a:fld id="{677919A6-33EB-49BD-A62F-1FA56B9F9712}" type="datetimeFigureOut">
               <a:rPr lang="en-US" dirty="0"/>
-              <a:t>11/27/2024</a:t>
+              <a:t>11/28/2024</a:t>
             </a:fld>
             <a:endParaRPr lang="en-US" dirty="0"/>
           </a:p>
@@ -2361,7 +2361,7 @@
           <a:p>
             <a:fld id="{CA4E7D1B-D673-4CF6-8672-009D42ABD2A0}" type="datetimeFigureOut">
               <a:rPr lang="en-US" dirty="0"/>
-              <a:t>11/27/2024</a:t>
+              <a:t>11/28/2024</a:t>
             </a:fld>
             <a:endParaRPr lang="en-US" dirty="0"/>
           </a:p>
@@ -2706,7 +2706,7 @@
           <a:p>
             <a:fld id="{DA16AA21-1863-4931-97CB-99D0A168701B}" type="datetimeFigureOut">
               <a:rPr lang="en-US" dirty="0"/>
-              <a:t>11/27/2024</a:t>
+              <a:t>11/28/2024</a:t>
             </a:fld>
             <a:endParaRPr lang="en-US" dirty="0"/>
           </a:p>
@@ -3126,7 +3126,7 @@
           <a:p>
             <a:fld id="{3772C379-9A7C-4C87-A116-CBE9F58B04C5}" type="datetimeFigureOut">
               <a:rPr lang="en-US" dirty="0"/>
-              <a:t>11/27/2024</a:t>
+              <a:t>11/28/2024</a:t>
             </a:fld>
             <a:endParaRPr lang="en-US" dirty="0"/>
           </a:p>
@@ -3402,7 +3402,7 @@
           <a:p>
             <a:fld id="{8664C608-40B1-4030-A28D-5B74BC98ADCE}" type="datetimeFigureOut">
               <a:rPr lang="en-US" dirty="0"/>
-              <a:t>11/27/2024</a:t>
+              <a:t>11/28/2024</a:t>
             </a:fld>
             <a:endParaRPr lang="en-US" dirty="0"/>
           </a:p>
@@ -4643,10 +4643,10 @@
       </p:sp>
       <p:pic>
         <p:nvPicPr>
-          <p:cNvPr id="1026" name="Picture 2">
+          <p:cNvPr id="4" name="Picture 2">
             <a:extLst>
               <a:ext uri="{FF2B5EF4-FFF2-40B4-BE49-F238E27FC236}">
-                <a16:creationId xmlns:a16="http://schemas.microsoft.com/office/drawing/2014/main" id="{1CCF2DD0-DB2B-8CFB-F179-F22D51B79683}"/>
+                <a16:creationId xmlns:a16="http://schemas.microsoft.com/office/drawing/2014/main" id="{D37EF6E5-D276-EA53-395E-593F0F86F48C}"/>
               </a:ext>
             </a:extLst>
           </p:cNvPr>
@@ -4670,8 +4670,8 @@
         </p:blipFill>
         <p:spPr bwMode="auto">
           <a:xfrm>
-            <a:off x="443125" y="1672942"/>
-            <a:ext cx="8474844" cy="5060889"/>
+            <a:off x="318499" y="1788479"/>
+            <a:ext cx="8106310" cy="4840813"/>
           </a:xfrm>
           <a:prstGeom prst="rect">
             <a:avLst/>
@@ -4790,10 +4790,10 @@
       </p:sp>
       <p:pic>
         <p:nvPicPr>
-          <p:cNvPr id="4" name="Picture 2">
+          <p:cNvPr id="2050" name="Picture 2">
             <a:extLst>
               <a:ext uri="{FF2B5EF4-FFF2-40B4-BE49-F238E27FC236}">
-                <a16:creationId xmlns:a16="http://schemas.microsoft.com/office/drawing/2014/main" id="{F2B45083-35B4-7E67-C0A3-BAB148CA9814}"/>
+                <a16:creationId xmlns:a16="http://schemas.microsoft.com/office/drawing/2014/main" id="{311F001C-7CF3-CCC1-AFD5-FAB05605D972}"/>
               </a:ext>
             </a:extLst>
           </p:cNvPr>
@@ -4817,8 +4817,8 @@
         </p:blipFill>
         <p:spPr bwMode="auto">
           <a:xfrm>
-            <a:off x="236306" y="1219203"/>
-            <a:ext cx="10587168" cy="5253515"/>
+            <a:off x="236306" y="1317768"/>
+            <a:ext cx="11325225" cy="5619750"/>
           </a:xfrm>
           <a:prstGeom prst="rect">
             <a:avLst/>
@@ -4937,10 +4937,10 @@
       </p:sp>
       <p:pic>
         <p:nvPicPr>
-          <p:cNvPr id="2052" name="Picture 4">
+          <p:cNvPr id="3074" name="Picture 2">
             <a:extLst>
               <a:ext uri="{FF2B5EF4-FFF2-40B4-BE49-F238E27FC236}">
-                <a16:creationId xmlns:a16="http://schemas.microsoft.com/office/drawing/2014/main" id="{D231D1F9-AEAA-AC9B-F042-B6650E3A2F0F}"/>
+                <a16:creationId xmlns:a16="http://schemas.microsoft.com/office/drawing/2014/main" id="{7544A273-834D-4907-5D15-AB5879D46BC2}"/>
               </a:ext>
             </a:extLst>
           </p:cNvPr>
@@ -4964,8 +4964,8 @@
         </p:blipFill>
         <p:spPr bwMode="auto">
           <a:xfrm>
-            <a:off x="297950" y="1849349"/>
-            <a:ext cx="8178229" cy="4878822"/>
+            <a:off x="297951" y="1592493"/>
+            <a:ext cx="8270818" cy="4934057"/>
           </a:xfrm>
           <a:prstGeom prst="rect">
             <a:avLst/>

</xml_diff>